<commit_message>
Datasheets added for components
</commit_message>
<xml_diff>
--- a/Documentation/99 - presentations/Air Quality Mapping demo.pptx
+++ b/Documentation/99 - presentations/Air Quality Mapping demo.pptx
@@ -3599,7 +3599,7 @@
           <a:p>
             <a:r>
               <a:rPr lang="en-GB" dirty="0"/>
-              <a:t>SSH into the Pi on the Network</a:t>
+              <a:t>Use of SSH</a:t>
             </a:r>
           </a:p>
           <a:p>
@@ -3861,6 +3861,58 @@
               <a:rPr lang="en-GB" dirty="0"/>
               <a:t>Links back to industrial year</a:t>
             </a:r>
+          </a:p>
+        </p:txBody>
+      </p:sp>
+      <p:sp>
+        <p:nvSpPr>
+          <p:cNvPr id="4" name="TextBox 3">
+            <a:extLst>
+              <a:ext uri="{FF2B5EF4-FFF2-40B4-BE49-F238E27FC236}">
+                <a16:creationId xmlns:a16="http://schemas.microsoft.com/office/drawing/2014/main" id="{F9753792-0CBA-4D46-BF30-812A0C5F1352}"/>
+              </a:ext>
+            </a:extLst>
+          </p:cNvPr>
+          <p:cNvSpPr txBox="1"/>
+          <p:nvPr/>
+        </p:nvSpPr>
+        <p:spPr>
+          <a:xfrm>
+            <a:off x="966486" y="5613721"/>
+            <a:ext cx="9601200" cy="923330"/>
+          </a:xfrm>
+          <a:prstGeom prst="rect">
+            <a:avLst/>
+          </a:prstGeom>
+          <a:noFill/>
+        </p:spPr>
+        <p:txBody>
+          <a:bodyPr wrap="square" rtlCol="0">
+            <a:spAutoFit/>
+          </a:bodyPr>
+          <a:lstStyle/>
+          <a:p>
+            <a:r>
+              <a:rPr lang="en-GB" dirty="0"/>
+              <a:t>The Royal College of Physicians (Published 2016) - </a:t>
+            </a:r>
+            <a:r>
+              <a:rPr lang="en-GB" i="1" u="sng" dirty="0">
+                <a:hlinkClick r:id="rId2"/>
+              </a:rPr>
+              <a:t>Every breath we take: the lifelong impact of air pollution</a:t>
+            </a:r>
+            <a:r>
+              <a:rPr lang="en-GB" dirty="0"/>
+              <a:t>, Accessed – 01/02/2018 </a:t>
+            </a:r>
+            <a:r>
+              <a:rPr lang="en-GB" u="sng" dirty="0">
+                <a:hlinkClick r:id="rId3"/>
+              </a:rPr>
+              <a:t>https://www.rcplondon.ac.uk/projects/outputs/every-breath-we-take-lifelong-impact-air-pollution</a:t>
+            </a:r>
+            <a:endParaRPr lang="en-GB" dirty="0"/>
           </a:p>
         </p:txBody>
       </p:sp>

</xml_diff>